<commit_message>
Added bullet point for Visual Studio Community
</commit_message>
<xml_diff>
--- a/Presentation/Conclusion/Conclusion.pptx
+++ b/Presentation/Conclusion/Conclusion.pptx
@@ -271,7 +271,7 @@
               <a:rPr lang="en-US" smtClean="0">
                 <a:latin typeface="Segoe UI" pitchFamily="34" charset="0"/>
               </a:rPr>
-              <a:t>10/1/2014 11:58 AM</a:t>
+              <a:t>2/10/2015 2:21 PM</a:t>
             </a:fld>
             <a:endParaRPr lang="en-US" dirty="0">
               <a:latin typeface="Segoe UI" pitchFamily="34" charset="0"/>
@@ -581,7 +581,7 @@
           <a:p>
             <a:fld id="{DDCD61BB-790A-4EFE-904A-F3FC061E4182}" type="datetime8">
               <a:rPr lang="en-US" smtClean="0"/>
-              <a:t>10/1/2014 11:58 AM</a:t>
+              <a:t>2/10/2015 2:21 PM</a:t>
             </a:fld>
             <a:endParaRPr lang="en-US" dirty="0"/>
           </a:p>
@@ -1474,7 +1474,7 @@
           <a:p>
             <a:fld id="{DDCD61BB-790A-4EFE-904A-F3FC061E4182}" type="datetime8">
               <a:rPr lang="en-US" smtClean="0"/>
-              <a:t>10/1/2014 12:36 PM</a:t>
+              <a:t>2/10/2015 2:21 PM</a:t>
             </a:fld>
             <a:endParaRPr lang="en-US" dirty="0"/>
           </a:p>
@@ -1749,7 +1749,7 @@
                 </a:solidFill>
               </a:rPr>
               <a:pPr/>
-              <a:t>10/1/2014 11:58 AM</a:t>
+              <a:t>2/10/2015 2:21 PM</a:t>
             </a:fld>
             <a:endParaRPr lang="en-US" dirty="0">
               <a:solidFill>
@@ -27051,15 +27051,7 @@
                     <a:schemeClr val="bg1"/>
                   </a:solidFill>
                 </a:rPr>
-                <a:t>http://</a:t>
-              </a:r>
-              <a:r>
-                <a:rPr lang="en-US" sz="3400" dirty="0" smtClean="0">
-                  <a:solidFill>
-                    <a:schemeClr val="bg1"/>
-                  </a:solidFill>
-                </a:rPr>
-                <a:t>aka.ms/CloudCamp-AzureTrial</a:t>
+                <a:t>http://aka.ms/CloudCamp-AzureTrial</a:t>
               </a:r>
               <a:endParaRPr lang="en-US" sz="3400" dirty="0">
                 <a:solidFill>
@@ -30208,15 +30200,7 @@
                     <a:schemeClr val="bg1"/>
                   </a:solidFill>
                 </a:rPr>
-                <a:t>http://</a:t>
-              </a:r>
-              <a:r>
-                <a:rPr lang="en-US" sz="3200" dirty="0" smtClean="0">
-                  <a:solidFill>
-                    <a:schemeClr val="bg1"/>
-                  </a:solidFill>
-                </a:rPr>
-                <a:t>aka.ms/CloudCamp-MSDNAzure</a:t>
+                <a:t>http://aka.ms/CloudCamp-MSDNAzure</a:t>
               </a:r>
               <a:endParaRPr lang="en-US" sz="3200" dirty="0">
                 <a:solidFill>
@@ -30886,7 +30870,7 @@
           <a:graphicData uri="http://schemas.openxmlformats.org/presentationml/2006/ole">
             <mc:AlternateContent xmlns:mc="http://schemas.openxmlformats.org/markup-compatibility/2006">
               <mc:Choice xmlns:v="urn:schemas-microsoft-com:vml" Requires="v">
-                <p:oleObj spid="_x0000_s1027" name="think-cell Slide" r:id="rId5" imgW="270" imgH="270" progId="TCLayout.ActiveDocument.1">
+                <p:oleObj spid="_x0000_s1028" name="think-cell Slide" r:id="rId5" imgW="270" imgH="270" progId="TCLayout.ActiveDocument.1">
                   <p:embed/>
                 </p:oleObj>
               </mc:Choice>
@@ -30933,7 +30917,7 @@
         </p:nvSpPr>
         <p:spPr>
           <a:xfrm>
-            <a:off x="518978" y="586882"/>
+            <a:off x="344773" y="585358"/>
             <a:ext cx="11155630" cy="553854"/>
           </a:xfrm>
           <a:prstGeom prst="rect">
@@ -30948,11 +30932,7 @@
           <a:p>
             <a:r>
               <a:rPr lang="en-US" sz="3999" dirty="0"/>
-              <a:t>Visual Studio </a:t>
-            </a:r>
-            <a:r>
-              <a:rPr lang="en-US" sz="3999" dirty="0"/>
-              <a:t>2013: </a:t>
+              <a:t>Visual Studio 2013: </a:t>
             </a:r>
             <a:r>
               <a:rPr lang="en-US" sz="3999" i="1" dirty="0"/>
@@ -30982,13 +30962,13 @@
         </p:nvSpPr>
         <p:spPr>
           <a:xfrm>
-            <a:off x="518978" y="1695903"/>
-            <a:ext cx="5403402" cy="3169273"/>
+            <a:off x="344773" y="1652689"/>
+            <a:ext cx="5804035" cy="3976606"/>
           </a:xfrm>
         </p:spPr>
         <p:txBody>
           <a:bodyPr>
-            <a:normAutofit lnSpcReduction="10000"/>
+            <a:normAutofit/>
           </a:bodyPr>
           <a:lstStyle/>
           <a:p>
@@ -31042,15 +31022,7 @@
                   <a:schemeClr val="bg2"/>
                 </a:solidFill>
               </a:rPr>
-              <a:t>Page </a:t>
-            </a:r>
-            <a:r>
-              <a:rPr lang="en-US" sz="2799" dirty="0">
-                <a:solidFill>
-                  <a:schemeClr val="bg2"/>
-                </a:solidFill>
-              </a:rPr>
-              <a:t>Inspector + Browser Link</a:t>
+              <a:t>Page Inspector + Browser Link</a:t>
             </a:r>
           </a:p>
           <a:p>
@@ -31086,15 +31058,7 @@
                   <a:schemeClr val="bg2"/>
                 </a:solidFill>
               </a:rPr>
-              <a:t>Web </a:t>
-            </a:r>
-            <a:r>
-              <a:rPr lang="en-US" sz="2799" dirty="0">
-                <a:solidFill>
-                  <a:schemeClr val="bg2"/>
-                </a:solidFill>
-              </a:rPr>
-              <a:t>Essentials </a:t>
+              <a:t>Web Essentials </a:t>
             </a:r>
             <a:r>
               <a:rPr lang="en-US" sz="2799" dirty="0" smtClean="0">
@@ -31103,6 +31067,24 @@
                 </a:solidFill>
               </a:rPr>
               <a:t>extension</a:t>
+            </a:r>
+          </a:p>
+          <a:p>
+            <a:pPr>
+              <a:spcBef>
+                <a:spcPts val="2399"/>
+              </a:spcBef>
+              <a:spcAft>
+                <a:spcPts val="0"/>
+              </a:spcAft>
+            </a:pPr>
+            <a:r>
+              <a:rPr lang="en-US" sz="2799" dirty="0" smtClean="0">
+                <a:solidFill>
+                  <a:schemeClr val="bg2"/>
+                </a:solidFill>
+              </a:rPr>
+              <a:t>Visual Studio Community Edition is FREE</a:t>
             </a:r>
             <a:endParaRPr lang="en-US" sz="2799" dirty="0">
               <a:solidFill>
@@ -31348,15 +31330,7 @@
                     <a:schemeClr val="bg1"/>
                   </a:solidFill>
                 </a:rPr>
-                <a:t>http</a:t>
-              </a:r>
-              <a:r>
-                <a:rPr lang="en-US" sz="3200" dirty="0" smtClean="0">
-                  <a:solidFill>
-                    <a:schemeClr val="bg1"/>
-                  </a:solidFill>
-                </a:rPr>
-                <a:t>://VisualStudio.com</a:t>
+                <a:t>http://VisualStudio.com</a:t>
               </a:r>
               <a:endParaRPr lang="en-US" sz="3200" dirty="0">
                 <a:solidFill>
@@ -31419,13 +31393,13 @@
   <p:clrMapOvr>
     <a:masterClrMapping/>
   </p:clrMapOvr>
-  <mc:AlternateContent xmlns:mc="http://schemas.openxmlformats.org/markup-compatibility/2006">
-    <mc:Choice xmlns:p14="http://schemas.microsoft.com/office/powerpoint/2010/main" Requires="p14">
+  <mc:AlternateContent xmlns:mc="http://schemas.openxmlformats.org/markup-compatibility/2006" xmlns:p14="http://schemas.microsoft.com/office/powerpoint/2010/main">
+    <mc:Choice Requires="p14">
       <p:transition spd="med" p14:dur="700">
         <p:fade/>
       </p:transition>
     </mc:Choice>
-    <mc:Fallback>
+    <mc:Fallback xmlns="">
       <p:transition spd="med">
         <p:fade/>
       </p:transition>
@@ -31879,15 +31853,118 @@
                                   </p:childTnLst>
                                 </p:cTn>
                               </p:par>
+                            </p:childTnLst>
+                          </p:cTn>
+                        </p:par>
+                      </p:childTnLst>
+                    </p:cTn>
+                  </p:par>
+                  <p:par>
+                    <p:cTn id="25" fill="hold">
+                      <p:stCondLst>
+                        <p:cond delay="indefinite"/>
+                      </p:stCondLst>
+                      <p:childTnLst>
+                        <p:par>
+                          <p:cTn id="26" fill="hold">
+                            <p:stCondLst>
+                              <p:cond delay="0"/>
+                            </p:stCondLst>
+                            <p:childTnLst>
                               <p:par>
-                                <p:cTn id="25" presetID="10" presetClass="entr" presetSubtype="0" fill="hold" nodeType="withEffect">
+                                <p:cTn id="27" presetID="2" presetClass="entr" presetSubtype="2" decel="100000" fill="hold" grpId="0" nodeType="clickEffect">
                                   <p:stCondLst>
                                     <p:cond delay="0"/>
                                   </p:stCondLst>
                                   <p:childTnLst>
                                     <p:set>
                                       <p:cBhvr>
-                                        <p:cTn id="26" dur="1" fill="hold">
+                                        <p:cTn id="28" dur="1" fill="hold">
+                                          <p:stCondLst>
+                                            <p:cond delay="0"/>
+                                          </p:stCondLst>
+                                        </p:cTn>
+                                        <p:tgtEl>
+                                          <p:spTgt spid="5">
+                                            <p:txEl>
+                                              <p:pRg st="5" end="5"/>
+                                            </p:txEl>
+                                          </p:spTgt>
+                                        </p:tgtEl>
+                                        <p:attrNameLst>
+                                          <p:attrName>style.visibility</p:attrName>
+                                        </p:attrNameLst>
+                                      </p:cBhvr>
+                                      <p:to>
+                                        <p:strVal val="visible"/>
+                                      </p:to>
+                                    </p:set>
+                                    <p:anim calcmode="lin" valueType="num">
+                                      <p:cBhvr additive="base">
+                                        <p:cTn id="29" dur="500" fill="hold"/>
+                                        <p:tgtEl>
+                                          <p:spTgt spid="5">
+                                            <p:txEl>
+                                              <p:pRg st="5" end="5"/>
+                                            </p:txEl>
+                                          </p:spTgt>
+                                        </p:tgtEl>
+                                        <p:attrNameLst>
+                                          <p:attrName>ppt_x</p:attrName>
+                                        </p:attrNameLst>
+                                      </p:cBhvr>
+                                      <p:tavLst>
+                                        <p:tav tm="0">
+                                          <p:val>
+                                            <p:strVal val="1+#ppt_w/2"/>
+                                          </p:val>
+                                        </p:tav>
+                                        <p:tav tm="100000">
+                                          <p:val>
+                                            <p:strVal val="#ppt_x"/>
+                                          </p:val>
+                                        </p:tav>
+                                      </p:tavLst>
+                                    </p:anim>
+                                    <p:anim calcmode="lin" valueType="num">
+                                      <p:cBhvr additive="base">
+                                        <p:cTn id="30" dur="500" fill="hold"/>
+                                        <p:tgtEl>
+                                          <p:spTgt spid="5">
+                                            <p:txEl>
+                                              <p:pRg st="5" end="5"/>
+                                            </p:txEl>
+                                          </p:spTgt>
+                                        </p:tgtEl>
+                                        <p:attrNameLst>
+                                          <p:attrName>ppt_y</p:attrName>
+                                        </p:attrNameLst>
+                                      </p:cBhvr>
+                                      <p:tavLst>
+                                        <p:tav tm="0">
+                                          <p:val>
+                                            <p:strVal val="#ppt_y"/>
+                                          </p:val>
+                                        </p:tav>
+                                        <p:tav tm="100000">
+                                          <p:val>
+                                            <p:strVal val="#ppt_y"/>
+                                          </p:val>
+                                        </p:tav>
+                                      </p:tavLst>
+                                    </p:anim>
+                                  </p:childTnLst>
+                                </p:cTn>
+                              </p:par>
+                              <p:par>
+                                <p:cTn id="31" presetID="10" presetClass="entr" presetSubtype="0" fill="hold" nodeType="withEffect">
+                                  <p:stCondLst>
+                                    <p:cond delay="0"/>
+                                  </p:stCondLst>
+                                  <p:childTnLst>
+                                    <p:set>
+                                      <p:cBhvr>
+                                        <p:cTn id="32" dur="1" fill="hold">
                                           <p:stCondLst>
                                             <p:cond delay="0"/>
                                           </p:stCondLst>
@@ -31905,7 +31982,7 @@
                                     </p:set>
                                     <p:animEffect transition="in" filter="fade">
                                       <p:cBhvr>
-                                        <p:cTn id="27" dur="500"/>
+                                        <p:cTn id="33" dur="500"/>
                                         <p:tgtEl>
                                           <p:spTgt spid="8"/>
                                         </p:tgtEl>
@@ -35666,6 +35743,15 @@
 </file>
 
 <file path=customXml/item1.xml><?xml version="1.0" encoding="utf-8"?>
+<?mso-contentType ?>
+<FormTemplates xmlns="http://schemas.microsoft.com/sharepoint/v3/contenttype/forms">
+  <Display>DocumentLibraryForm</Display>
+  <Edit>DocumentLibraryForm</Edit>
+  <New>DocumentLibraryForm</New>
+</FormTemplates>
+</file>
+
+<file path=customXml/item2.xml><?xml version="1.0" encoding="utf-8"?>
 <ct:contentTypeSchema xmlns:ct="http://schemas.microsoft.com/office/2006/metadata/contentType" xmlns:ma="http://schemas.microsoft.com/office/2006/metadata/properties/metaAttributes" ct:_="" ma:_="" ma:contentTypeName="Document" ma:contentTypeID="0x0101004A821E223A3BC347949CC2419033DBE2" ma:contentTypeVersion="1" ma:contentTypeDescription="Create a new document." ma:contentTypeScope="" ma:versionID="519c6bc90736a6e8abbbdb38ed934ac6">
   <xsd:schema xmlns:xsd="http://www.w3.org/2001/XMLSchema" xmlns:xs="http://www.w3.org/2001/XMLSchema" xmlns:p="http://schemas.microsoft.com/office/2006/metadata/properties" xmlns:ns2="fee586e5-3c92-48eb-9898-42915e590ada" targetNamespace="http://schemas.microsoft.com/office/2006/metadata/properties" ma:root="true" ma:fieldsID="4da06bcf8031bc55fa8390c6716287b0" ns2:_="">
     <xsd:import namespace="fee586e5-3c92-48eb-9898-42915e590ada"/>
@@ -35805,15 +35891,6 @@
 </ct:contentTypeSchema>
 </file>
 
-<file path=customXml/item2.xml><?xml version="1.0" encoding="utf-8"?>
-<?mso-contentType ?>
-<FormTemplates xmlns="http://schemas.microsoft.com/sharepoint/v3/contenttype/forms">
-  <Display>DocumentLibraryForm</Display>
-  <Edit>DocumentLibraryForm</Edit>
-  <New>DocumentLibraryForm</New>
-</FormTemplates>
-</file>
-
 <file path=customXml/item3.xml><?xml version="1.0" encoding="utf-8"?>
 <p:properties xmlns:p="http://schemas.microsoft.com/office/2006/metadata/properties" xmlns:xsi="http://www.w3.org/2001/XMLSchema-instance" xmlns:pc="http://schemas.microsoft.com/office/infopath/2007/PartnerControls">
   <documentManagement>
@@ -35839,6 +35916,14 @@
 </file>
 
 <file path=customXml/itemProps1.xml><?xml version="1.0" encoding="utf-8"?>
+<ds:datastoreItem xmlns:ds="http://schemas.openxmlformats.org/officeDocument/2006/customXml" ds:itemID="{8587D03C-DCD5-4A24-A48F-FDD3322C1278}">
+  <ds:schemaRefs>
+    <ds:schemaRef ds:uri="http://schemas.microsoft.com/sharepoint/v3/contenttype/forms"/>
+  </ds:schemaRefs>
+</ds:datastoreItem>
+</file>
+
+<file path=customXml/itemProps2.xml><?xml version="1.0" encoding="utf-8"?>
 <ds:datastoreItem xmlns:ds="http://schemas.openxmlformats.org/officeDocument/2006/customXml" ds:itemID="{3093EB58-A3C8-4EFB-858C-7BC99E7AE93C}">
   <ds:schemaRefs>
     <ds:schemaRef ds:uri="http://schemas.microsoft.com/office/2006/metadata/contentType"/>
@@ -35852,14 +35937,6 @@
     <ds:schemaRef ds:uri="http://purl.org/dc/elements/1.1/"/>
     <ds:schemaRef ds:uri="http://purl.org/dc/terms/"/>
     <ds:schemaRef ds:uri="http://schemas.microsoft.com/internal/obd"/>
-  </ds:schemaRefs>
-</ds:datastoreItem>
-</file>
-
-<file path=customXml/itemProps2.xml><?xml version="1.0" encoding="utf-8"?>
-<ds:datastoreItem xmlns:ds="http://schemas.openxmlformats.org/officeDocument/2006/customXml" ds:itemID="{8587D03C-DCD5-4A24-A48F-FDD3322C1278}">
-  <ds:schemaRefs>
-    <ds:schemaRef ds:uri="http://schemas.microsoft.com/sharepoint/v3/contenttype/forms"/>
   </ds:schemaRefs>
 </ds:datastoreItem>
 </file>

</xml_diff>